<commit_message>
Update testsuite and figures
</commit_message>
<xml_diff>
--- a/Figures/Arc/Framework.pptx
+++ b/Figures/Arc/Framework.pptx
@@ -197,7 +197,7 @@
           <a:p>
             <a:fld id="{BA9E6BC5-D4E3-2545-9D5D-756025825D87}" type="datetimeFigureOut">
               <a:rPr lang="en-US" smtClean="0"/>
-              <a:t>7/11/25</a:t>
+              <a:t>7/18/25</a:t>
             </a:fld>
             <a:endParaRPr lang="en-US"/>
           </a:p>
@@ -542,7 +542,7 @@
               <a:t>ini</a:t>
             </a:r>
             <a:r>
-              <a:rPr lang="en-US"/>
+              <a:rPr lang="en-US" dirty="0"/>
               <a:t> $1 $1 &amp; }</a:t>
             </a:r>
           </a:p>
@@ -731,7 +731,7 @@
           <a:p>
             <a:fld id="{6789D53B-E616-394C-9BC2-C4D8A383D3A5}" type="datetimeFigureOut">
               <a:rPr lang="en-US" smtClean="0"/>
-              <a:t>7/11/25</a:t>
+              <a:t>7/18/25</a:t>
             </a:fld>
             <a:endParaRPr lang="en-US"/>
           </a:p>
@@ -929,7 +929,7 @@
           <a:p>
             <a:fld id="{6789D53B-E616-394C-9BC2-C4D8A383D3A5}" type="datetimeFigureOut">
               <a:rPr lang="en-US" smtClean="0"/>
-              <a:t>7/11/25</a:t>
+              <a:t>7/18/25</a:t>
             </a:fld>
             <a:endParaRPr lang="en-US"/>
           </a:p>
@@ -1137,7 +1137,7 @@
           <a:p>
             <a:fld id="{6789D53B-E616-394C-9BC2-C4D8A383D3A5}" type="datetimeFigureOut">
               <a:rPr lang="en-US" smtClean="0"/>
-              <a:t>7/11/25</a:t>
+              <a:t>7/18/25</a:t>
             </a:fld>
             <a:endParaRPr lang="en-US"/>
           </a:p>
@@ -1335,7 +1335,7 @@
           <a:p>
             <a:fld id="{6789D53B-E616-394C-9BC2-C4D8A383D3A5}" type="datetimeFigureOut">
               <a:rPr lang="en-US" smtClean="0"/>
-              <a:t>7/11/25</a:t>
+              <a:t>7/18/25</a:t>
             </a:fld>
             <a:endParaRPr lang="en-US"/>
           </a:p>
@@ -1610,7 +1610,7 @@
           <a:p>
             <a:fld id="{6789D53B-E616-394C-9BC2-C4D8A383D3A5}" type="datetimeFigureOut">
               <a:rPr lang="en-US" smtClean="0"/>
-              <a:t>7/11/25</a:t>
+              <a:t>7/18/25</a:t>
             </a:fld>
             <a:endParaRPr lang="en-US"/>
           </a:p>
@@ -1875,7 +1875,7 @@
           <a:p>
             <a:fld id="{6789D53B-E616-394C-9BC2-C4D8A383D3A5}" type="datetimeFigureOut">
               <a:rPr lang="en-US" smtClean="0"/>
-              <a:t>7/11/25</a:t>
+              <a:t>7/18/25</a:t>
             </a:fld>
             <a:endParaRPr lang="en-US"/>
           </a:p>
@@ -2287,7 +2287,7 @@
           <a:p>
             <a:fld id="{6789D53B-E616-394C-9BC2-C4D8A383D3A5}" type="datetimeFigureOut">
               <a:rPr lang="en-US" smtClean="0"/>
-              <a:t>7/11/25</a:t>
+              <a:t>7/18/25</a:t>
             </a:fld>
             <a:endParaRPr lang="en-US"/>
           </a:p>
@@ -2428,7 +2428,7 @@
           <a:p>
             <a:fld id="{6789D53B-E616-394C-9BC2-C4D8A383D3A5}" type="datetimeFigureOut">
               <a:rPr lang="en-US" smtClean="0"/>
-              <a:t>7/11/25</a:t>
+              <a:t>7/18/25</a:t>
             </a:fld>
             <a:endParaRPr lang="en-US"/>
           </a:p>
@@ -2541,7 +2541,7 @@
           <a:p>
             <a:fld id="{6789D53B-E616-394C-9BC2-C4D8A383D3A5}" type="datetimeFigureOut">
               <a:rPr lang="en-US" smtClean="0"/>
-              <a:t>7/11/25</a:t>
+              <a:t>7/18/25</a:t>
             </a:fld>
             <a:endParaRPr lang="en-US"/>
           </a:p>
@@ -2852,7 +2852,7 @@
           <a:p>
             <a:fld id="{6789D53B-E616-394C-9BC2-C4D8A383D3A5}" type="datetimeFigureOut">
               <a:rPr lang="en-US" smtClean="0"/>
-              <a:t>7/11/25</a:t>
+              <a:t>7/18/25</a:t>
             </a:fld>
             <a:endParaRPr lang="en-US"/>
           </a:p>
@@ -3140,7 +3140,7 @@
           <a:p>
             <a:fld id="{6789D53B-E616-394C-9BC2-C4D8A383D3A5}" type="datetimeFigureOut">
               <a:rPr lang="en-US" smtClean="0"/>
-              <a:t>7/11/25</a:t>
+              <a:t>7/18/25</a:t>
             </a:fld>
             <a:endParaRPr lang="en-US"/>
           </a:p>
@@ -3381,7 +3381,7 @@
           <a:p>
             <a:fld id="{6789D53B-E616-394C-9BC2-C4D8A383D3A5}" type="datetimeFigureOut">
               <a:rPr lang="en-US" smtClean="0"/>
-              <a:t>7/11/25</a:t>
+              <a:t>7/18/25</a:t>
             </a:fld>
             <a:endParaRPr lang="en-US"/>
           </a:p>
@@ -3798,6 +3798,55 @@
           <a:chExt cx="0" cy="0"/>
         </a:xfrm>
       </p:grpSpPr>
+      <p:sp>
+        <p:nvSpPr>
+          <p:cNvPr id="46" name="Rectangle 45">
+            <a:extLst>
+              <a:ext uri="{FF2B5EF4-FFF2-40B4-BE49-F238E27FC236}">
+                <a16:creationId xmlns:a16="http://schemas.microsoft.com/office/drawing/2014/main" id="{D09D0ECF-9D40-CDAD-3976-72E0ACB90122}"/>
+              </a:ext>
+            </a:extLst>
+          </p:cNvPr>
+          <p:cNvSpPr/>
+          <p:nvPr/>
+        </p:nvSpPr>
+        <p:spPr>
+          <a:xfrm>
+            <a:off x="7332514" y="2248289"/>
+            <a:ext cx="896112" cy="892553"/>
+          </a:xfrm>
+          <a:prstGeom prst="rect">
+            <a:avLst/>
+          </a:prstGeom>
+          <a:solidFill>
+            <a:schemeClr val="accent2"/>
+          </a:solidFill>
+        </p:spPr>
+        <p:style>
+          <a:lnRef idx="2">
+            <a:schemeClr val="accent1">
+              <a:shade val="15000"/>
+            </a:schemeClr>
+          </a:lnRef>
+          <a:fillRef idx="1">
+            <a:schemeClr val="accent1"/>
+          </a:fillRef>
+          <a:effectRef idx="0">
+            <a:schemeClr val="accent1"/>
+          </a:effectRef>
+          <a:fontRef idx="minor">
+            <a:schemeClr val="lt1"/>
+          </a:fontRef>
+        </p:style>
+        <p:txBody>
+          <a:bodyPr rtlCol="0" anchor="ctr"/>
+          <a:lstStyle/>
+          <a:p>
+            <a:pPr algn="ctr"/>
+            <a:endParaRPr lang="en-US" dirty="0"/>
+          </a:p>
+        </p:txBody>
+      </p:sp>
       <p:cxnSp>
         <p:nvCxnSpPr>
           <p:cNvPr id="2" name="Elbow Connector 1">
@@ -3816,12 +3865,12 @@
         </p:nvCxnSpPr>
         <p:spPr>
           <a:xfrm flipV="1">
-            <a:off x="6046800" y="2423234"/>
-            <a:ext cx="251562" cy="240361"/>
+            <a:off x="5977792" y="2423234"/>
+            <a:ext cx="173928" cy="240361"/>
           </a:xfrm>
           <a:prstGeom prst="bentConnector3">
             <a:avLst>
-              <a:gd name="adj1" fmla="val 50000"/>
+              <a:gd name="adj1" fmla="val 40080"/>
             </a:avLst>
           </a:prstGeom>
           <a:ln>
@@ -3861,12 +3910,12 @@
         </p:nvCxnSpPr>
         <p:spPr>
           <a:xfrm>
-            <a:off x="6046800" y="2663595"/>
-            <a:ext cx="251561" cy="997313"/>
+            <a:off x="5977792" y="2663595"/>
+            <a:ext cx="173927" cy="997313"/>
           </a:xfrm>
           <a:prstGeom prst="bentConnector3">
             <a:avLst>
-              <a:gd name="adj1" fmla="val 50000"/>
+              <a:gd name="adj1" fmla="val 40081"/>
             </a:avLst>
           </a:prstGeom>
           <a:ln>
@@ -3905,8 +3954,8 @@
         </p:nvCxnSpPr>
         <p:spPr>
           <a:xfrm>
-            <a:off x="4396875" y="2179797"/>
-            <a:ext cx="247591" cy="0"/>
+            <a:off x="4565160" y="2179797"/>
+            <a:ext cx="201267" cy="0"/>
           </a:xfrm>
           <a:prstGeom prst="straightConnector1">
             <a:avLst/>
@@ -3947,8 +3996,8 @@
         </p:nvCxnSpPr>
         <p:spPr>
           <a:xfrm>
-            <a:off x="4399299" y="1849149"/>
-            <a:ext cx="245167" cy="0"/>
+            <a:off x="4567738" y="1849149"/>
+            <a:ext cx="201113" cy="0"/>
           </a:xfrm>
           <a:prstGeom prst="straightConnector1">
             <a:avLst/>
@@ -3990,12 +4039,12 @@
         </p:nvCxnSpPr>
         <p:spPr>
           <a:xfrm flipV="1">
-            <a:off x="7314797" y="1992233"/>
-            <a:ext cx="229676" cy="431001"/>
+            <a:off x="7168155" y="1992233"/>
+            <a:ext cx="164358" cy="431001"/>
           </a:xfrm>
           <a:prstGeom prst="bentConnector3">
             <a:avLst>
-              <a:gd name="adj1" fmla="val 50000"/>
+              <a:gd name="adj1" fmla="val 31630"/>
             </a:avLst>
           </a:prstGeom>
           <a:ln>
@@ -4029,18 +4078,18 @@
           <p:cNvCxnSpPr>
             <a:cxnSpLocks/>
             <a:stCxn id="23" idx="0"/>
-            <a:endCxn id="20" idx="1"/>
+            <a:endCxn id="46" idx="1"/>
           </p:cNvCxnSpPr>
           <p:nvPr/>
         </p:nvCxnSpPr>
         <p:spPr>
           <a:xfrm>
-            <a:off x="7314797" y="2423234"/>
-            <a:ext cx="229677" cy="290198"/>
+            <a:off x="7168155" y="2423234"/>
+            <a:ext cx="164359" cy="271332"/>
           </a:xfrm>
           <a:prstGeom prst="bentConnector3">
             <a:avLst>
-              <a:gd name="adj1" fmla="val 50000"/>
+              <a:gd name="adj1" fmla="val 31631"/>
             </a:avLst>
           </a:prstGeom>
           <a:ln>
@@ -4080,12 +4129,12 @@
         </p:nvCxnSpPr>
         <p:spPr>
           <a:xfrm>
-            <a:off x="7315850" y="3660908"/>
-            <a:ext cx="228622" cy="224195"/>
+            <a:off x="7169208" y="3660908"/>
+            <a:ext cx="163305" cy="224195"/>
           </a:xfrm>
           <a:prstGeom prst="bentConnector3">
             <a:avLst>
-              <a:gd name="adj1" fmla="val 50000"/>
+              <a:gd name="adj1" fmla="val 34153"/>
             </a:avLst>
           </a:prstGeom>
           <a:ln>
@@ -4125,12 +4174,12 @@
         </p:nvCxnSpPr>
         <p:spPr>
           <a:xfrm flipV="1">
-            <a:off x="7315850" y="3487069"/>
-            <a:ext cx="228623" cy="173839"/>
+            <a:off x="7169208" y="3487069"/>
+            <a:ext cx="163305" cy="173839"/>
           </a:xfrm>
           <a:prstGeom prst="bentConnector3">
             <a:avLst>
-              <a:gd name="adj1" fmla="val 50000"/>
+              <a:gd name="adj1" fmla="val 34153"/>
             </a:avLst>
           </a:prstGeom>
           <a:ln>
@@ -4167,9 +4216,9 @@
           <p:nvPr/>
         </p:nvCxnSpPr>
         <p:spPr>
-          <a:xfrm>
-            <a:off x="6046802" y="3187497"/>
-            <a:ext cx="128623" cy="0"/>
+          <a:xfrm flipV="1">
+            <a:off x="5982107" y="3186806"/>
+            <a:ext cx="72581" cy="691"/>
           </a:xfrm>
           <a:prstGeom prst="line">
             <a:avLst/>
@@ -4204,8 +4253,8 @@
         </p:nvSpPr>
         <p:spPr>
           <a:xfrm>
-            <a:off x="4644466" y="1512159"/>
-            <a:ext cx="415485" cy="2780732"/>
+            <a:off x="4755864" y="1512159"/>
+            <a:ext cx="305895" cy="2780732"/>
           </a:xfrm>
           <a:prstGeom prst="snip2DiagRect">
             <a:avLst/>
@@ -4241,7 +4290,6 @@
           <a:bodyPr rtlCol="0" anchor="ctr"/>
           <a:lstStyle/>
           <a:p>
-            <a:pPr algn="ctr"/>
             <a:r>
               <a:rPr lang="en-US" sz="1400" dirty="0"/>
               <a:t>LLM</a:t>
@@ -4263,8 +4311,8 @@
         </p:nvSpPr>
         <p:spPr>
           <a:xfrm>
-            <a:off x="7544473" y="1853733"/>
-            <a:ext cx="1109667" cy="276999"/>
+            <a:off x="7332513" y="1853733"/>
+            <a:ext cx="896112" cy="276999"/>
           </a:xfrm>
           <a:prstGeom prst="rect">
             <a:avLst/>
@@ -4296,14 +4344,11 @@
           </a:bodyPr>
           <a:lstStyle/>
           <a:p>
-            <a:r>
-              <a:rPr lang="en-US" sz="1200" dirty="0">
-                <a:solidFill>
-                  <a:schemeClr val="bg1"/>
-                </a:solidFill>
-              </a:rPr>
-              <a:t>Pass</a:t>
-            </a:r>
+            <a:endParaRPr lang="en-US" sz="1200" dirty="0">
+              <a:solidFill>
+                <a:schemeClr val="bg1"/>
+              </a:solidFill>
+            </a:endParaRPr>
           </a:p>
         </p:txBody>
       </p:sp>
@@ -4321,7 +4366,7 @@
         </p:nvSpPr>
         <p:spPr>
           <a:xfrm>
-            <a:off x="5262912" y="2202161"/>
+            <a:off x="5202530" y="2202161"/>
             <a:ext cx="783890" cy="1280333"/>
           </a:xfrm>
           <a:prstGeom prst="snip1Rect">
@@ -4365,7 +4410,7 @@
         </p:nvSpPr>
         <p:spPr>
           <a:xfrm>
-            <a:off x="5262912" y="2144795"/>
+            <a:off x="5202530" y="2144795"/>
             <a:ext cx="736876" cy="307777"/>
           </a:xfrm>
           <a:prstGeom prst="rect">
@@ -4402,7 +4447,7 @@
         </p:nvSpPr>
         <p:spPr>
           <a:xfrm>
-            <a:off x="5206544" y="2448151"/>
+            <a:off x="5137536" y="2448151"/>
             <a:ext cx="840256" cy="430887"/>
           </a:xfrm>
           <a:prstGeom prst="rect">
@@ -4435,10 +4480,10 @@
       </p:sp>
       <p:sp>
         <p:nvSpPr>
-          <p:cNvPr id="20" name="TextBox 19">
-            <a:extLst>
-              <a:ext uri="{FF2B5EF4-FFF2-40B4-BE49-F238E27FC236}">
-                <a16:creationId xmlns:a16="http://schemas.microsoft.com/office/drawing/2014/main" id="{EF2FB659-F8DD-8319-EFA4-1E641B46C04A}"/>
+          <p:cNvPr id="21" name="TextBox 20">
+            <a:extLst>
+              <a:ext uri="{FF2B5EF4-FFF2-40B4-BE49-F238E27FC236}">
+                <a16:creationId xmlns:a16="http://schemas.microsoft.com/office/drawing/2014/main" id="{27266CA1-8CFC-82E5-BFF6-CE671331167A}"/>
               </a:ext>
             </a:extLst>
           </p:cNvPr>
@@ -4447,14 +4492,17 @@
         </p:nvSpPr>
         <p:spPr>
           <a:xfrm>
-            <a:off x="7544474" y="2251767"/>
-            <a:ext cx="1109665" cy="923330"/>
+            <a:off x="7332513" y="3348569"/>
+            <a:ext cx="896112" cy="276999"/>
           </a:xfrm>
           <a:prstGeom prst="rect">
             <a:avLst/>
           </a:prstGeom>
           <a:solidFill>
-            <a:schemeClr val="accent2"/>
+            <a:schemeClr val="accent6">
+              <a:lumMod val="60000"/>
+              <a:lumOff val="40000"/>
+            </a:schemeClr>
           </a:solidFill>
         </p:spPr>
         <p:style>
@@ -4477,68 +4525,20 @@
           </a:bodyPr>
           <a:lstStyle/>
           <a:p>
-            <a:r>
-              <a:rPr lang="en-US" sz="1200" dirty="0">
-                <a:solidFill>
-                  <a:schemeClr val="bg1"/>
-                </a:solidFill>
-              </a:rPr>
-              <a:t>Fail</a:t>
-            </a:r>
-            <a:endParaRPr lang="en-US" sz="1400" dirty="0">
+            <a:endParaRPr lang="en-US" sz="1200" dirty="0">
               <a:solidFill>
                 <a:schemeClr val="bg1"/>
               </a:solidFill>
             </a:endParaRPr>
           </a:p>
-          <a:p>
-            <a:r>
-              <a:rPr lang="en-US" sz="1000" dirty="0">
-                <a:solidFill>
-                  <a:schemeClr val="bg1"/>
-                </a:solidFill>
-              </a:rPr>
-              <a:t>    Syntax Error</a:t>
-            </a:r>
-          </a:p>
-          <a:p>
-            <a:r>
-              <a:rPr lang="en-US" sz="1000" dirty="0">
-                <a:solidFill>
-                  <a:schemeClr val="bg1"/>
-                </a:solidFill>
-              </a:rPr>
-              <a:t>     Unsafe Cast</a:t>
-            </a:r>
-          </a:p>
-          <a:p>
-            <a:r>
-              <a:rPr lang="en-US" sz="1000" dirty="0">
-                <a:solidFill>
-                  <a:schemeClr val="bg1"/>
-                </a:solidFill>
-              </a:rPr>
-              <a:t>     Memory Error</a:t>
-            </a:r>
-          </a:p>
-          <a:p>
-            <a:r>
-              <a:rPr lang="en-US" sz="1000" dirty="0">
-                <a:solidFill>
-                  <a:schemeClr val="bg1"/>
-                </a:solidFill>
-              </a:rPr>
-              <a:t>     …</a:t>
-            </a:r>
-          </a:p>
-        </p:txBody>
-      </p:sp>
-      <p:sp>
-        <p:nvSpPr>
-          <p:cNvPr id="21" name="TextBox 20">
-            <a:extLst>
-              <a:ext uri="{FF2B5EF4-FFF2-40B4-BE49-F238E27FC236}">
-                <a16:creationId xmlns:a16="http://schemas.microsoft.com/office/drawing/2014/main" id="{27266CA1-8CFC-82E5-BFF6-CE671331167A}"/>
+        </p:txBody>
+      </p:sp>
+      <p:sp>
+        <p:nvSpPr>
+          <p:cNvPr id="22" name="TextBox 21">
+            <a:extLst>
+              <a:ext uri="{FF2B5EF4-FFF2-40B4-BE49-F238E27FC236}">
+                <a16:creationId xmlns:a16="http://schemas.microsoft.com/office/drawing/2014/main" id="{3137AC2D-9808-5384-5687-2A7DD8303D28}"/>
               </a:ext>
             </a:extLst>
           </p:cNvPr>
@@ -4547,17 +4547,14 @@
         </p:nvSpPr>
         <p:spPr>
           <a:xfrm>
-            <a:off x="7544473" y="3348569"/>
-            <a:ext cx="1109667" cy="276999"/>
+            <a:off x="7332513" y="3746603"/>
+            <a:ext cx="896112" cy="276999"/>
           </a:xfrm>
           <a:prstGeom prst="rect">
             <a:avLst/>
           </a:prstGeom>
           <a:solidFill>
-            <a:schemeClr val="accent6">
-              <a:lumMod val="60000"/>
-              <a:lumOff val="40000"/>
-            </a:schemeClr>
+            <a:schemeClr val="accent2"/>
           </a:solidFill>
         </p:spPr>
         <p:style>
@@ -4580,69 +4577,11 @@
           </a:bodyPr>
           <a:lstStyle/>
           <a:p>
-            <a:r>
-              <a:rPr lang="en-US" sz="1200" dirty="0">
-                <a:solidFill>
-                  <a:schemeClr val="bg1"/>
-                </a:solidFill>
-              </a:rPr>
-              <a:t>Pass</a:t>
-            </a:r>
-          </a:p>
-        </p:txBody>
-      </p:sp>
-      <p:sp>
-        <p:nvSpPr>
-          <p:cNvPr id="22" name="TextBox 21">
-            <a:extLst>
-              <a:ext uri="{FF2B5EF4-FFF2-40B4-BE49-F238E27FC236}">
-                <a16:creationId xmlns:a16="http://schemas.microsoft.com/office/drawing/2014/main" id="{3137AC2D-9808-5384-5687-2A7DD8303D28}"/>
-              </a:ext>
-            </a:extLst>
-          </p:cNvPr>
-          <p:cNvSpPr txBox="1"/>
-          <p:nvPr/>
-        </p:nvSpPr>
-        <p:spPr>
-          <a:xfrm>
-            <a:off x="7544472" y="3746603"/>
-            <a:ext cx="1109667" cy="276999"/>
-          </a:xfrm>
-          <a:prstGeom prst="rect">
-            <a:avLst/>
-          </a:prstGeom>
-          <a:solidFill>
-            <a:schemeClr val="accent2"/>
-          </a:solidFill>
-        </p:spPr>
-        <p:style>
-          <a:lnRef idx="2">
-            <a:schemeClr val="dk1"/>
-          </a:lnRef>
-          <a:fillRef idx="1">
-            <a:schemeClr val="lt1"/>
-          </a:fillRef>
-          <a:effectRef idx="0">
-            <a:schemeClr val="dk1"/>
-          </a:effectRef>
-          <a:fontRef idx="minor">
-            <a:schemeClr val="dk1"/>
-          </a:fontRef>
-        </p:style>
-        <p:txBody>
-          <a:bodyPr wrap="square" rtlCol="0">
-            <a:spAutoFit/>
-          </a:bodyPr>
-          <a:lstStyle/>
-          <a:p>
-            <a:r>
-              <a:rPr lang="en-US" sz="1200" dirty="0">
-                <a:solidFill>
-                  <a:schemeClr val="bg1"/>
-                </a:solidFill>
-              </a:rPr>
-              <a:t>Fail</a:t>
-            </a:r>
+            <a:endParaRPr lang="en-US" sz="1200" dirty="0">
+              <a:solidFill>
+                <a:schemeClr val="bg1"/>
+              </a:solidFill>
+            </a:endParaRPr>
           </a:p>
         </p:txBody>
       </p:sp>
@@ -4660,7 +4599,7 @@
         </p:nvSpPr>
         <p:spPr>
           <a:xfrm>
-            <a:off x="6298362" y="1910201"/>
+            <a:off x="6151720" y="1910201"/>
             <a:ext cx="1016435" cy="1026066"/>
           </a:xfrm>
           <a:prstGeom prst="snip2DiagRect">
@@ -4716,7 +4655,7 @@
         </p:nvSpPr>
         <p:spPr>
           <a:xfrm>
-            <a:off x="6298361" y="3248362"/>
+            <a:off x="6151719" y="3248362"/>
             <a:ext cx="1017489" cy="825092"/>
           </a:xfrm>
           <a:prstGeom prst="snip2DiagRect">
@@ -4772,8 +4711,8 @@
         </p:nvSpPr>
         <p:spPr>
           <a:xfrm>
-            <a:off x="3309177" y="2455546"/>
-            <a:ext cx="750611" cy="814014"/>
+            <a:off x="3772344" y="2455546"/>
+            <a:ext cx="705816" cy="814014"/>
           </a:xfrm>
           <a:prstGeom prst="snip1Rect">
             <a:avLst/>
@@ -4816,8 +4755,8 @@
         </p:nvSpPr>
         <p:spPr>
           <a:xfrm>
-            <a:off x="3364755" y="2489608"/>
-            <a:ext cx="750611" cy="814014"/>
+            <a:off x="3827922" y="2489608"/>
+            <a:ext cx="705816" cy="814014"/>
           </a:xfrm>
           <a:prstGeom prst="snip1Rect">
             <a:avLst/>
@@ -4860,8 +4799,8 @@
         </p:nvSpPr>
         <p:spPr>
           <a:xfrm>
-            <a:off x="3420333" y="2523670"/>
-            <a:ext cx="750611" cy="814014"/>
+            <a:off x="3883500" y="2523670"/>
+            <a:ext cx="705816" cy="814014"/>
           </a:xfrm>
           <a:prstGeom prst="snip1Rect">
             <a:avLst/>
@@ -4904,8 +4843,8 @@
         </p:nvSpPr>
         <p:spPr>
           <a:xfrm>
-            <a:off x="3420333" y="2515142"/>
-            <a:ext cx="750611" cy="307777"/>
+            <a:off x="3883500" y="2515142"/>
+            <a:ext cx="705816" cy="307777"/>
           </a:xfrm>
           <a:prstGeom prst="rect">
             <a:avLst/>
@@ -4941,8 +4880,8 @@
         </p:nvSpPr>
         <p:spPr>
           <a:xfrm>
-            <a:off x="3103952" y="1726038"/>
-            <a:ext cx="1295347" cy="246221"/>
+            <a:off x="3007293" y="1726038"/>
+            <a:ext cx="1560445" cy="246221"/>
           </a:xfrm>
           <a:prstGeom prst="rect">
             <a:avLst/>
@@ -4992,8 +4931,8 @@
         </p:nvSpPr>
         <p:spPr>
           <a:xfrm>
-            <a:off x="3102820" y="1736157"/>
-            <a:ext cx="1269183" cy="246221"/>
+            <a:off x="2955883" y="1710279"/>
+            <a:ext cx="1418624" cy="276999"/>
           </a:xfrm>
           <a:prstGeom prst="rect">
             <a:avLst/>
@@ -5007,7 +4946,7 @@
           <a:lstStyle/>
           <a:p>
             <a:r>
-              <a:rPr lang="en-US" sz="1000" dirty="0"/>
+              <a:rPr lang="en-US" sz="1200" dirty="0"/>
               <a:t>Bug Fixing Prompt</a:t>
             </a:r>
           </a:p>
@@ -5027,8 +4966,8 @@
         </p:nvSpPr>
         <p:spPr>
           <a:xfrm>
-            <a:off x="3102820" y="2050030"/>
-            <a:ext cx="1294055" cy="259534"/>
+            <a:off x="3006270" y="2050030"/>
+            <a:ext cx="1558890" cy="259534"/>
           </a:xfrm>
           <a:prstGeom prst="rect">
             <a:avLst/>
@@ -5078,8 +5017,8 @@
         </p:nvSpPr>
         <p:spPr>
           <a:xfrm>
-            <a:off x="3062303" y="2055267"/>
-            <a:ext cx="1425205" cy="246221"/>
+            <a:off x="2937252" y="2042328"/>
+            <a:ext cx="1689961" cy="276999"/>
           </a:xfrm>
           <a:prstGeom prst="rect">
             <a:avLst/>
@@ -5093,7 +5032,7 @@
           <a:lstStyle/>
           <a:p>
             <a:r>
-              <a:rPr lang="en-US" sz="1000" dirty="0"/>
+              <a:rPr lang="en-US" sz="1200" dirty="0"/>
               <a:t>New Function Prompt</a:t>
             </a:r>
           </a:p>
@@ -5113,8 +5052,8 @@
         </p:nvSpPr>
         <p:spPr>
           <a:xfrm>
-            <a:off x="5206543" y="2943023"/>
-            <a:ext cx="968882" cy="430887"/>
+            <a:off x="5137535" y="2943023"/>
+            <a:ext cx="945139" cy="430887"/>
           </a:xfrm>
           <a:prstGeom prst="rect">
             <a:avLst/>
@@ -5158,7 +5097,7 @@
         </p:nvSpPr>
         <p:spPr>
           <a:xfrm>
-            <a:off x="6253922" y="3405706"/>
+            <a:off x="6107280" y="3405706"/>
             <a:ext cx="1122346" cy="523220"/>
           </a:xfrm>
           <a:prstGeom prst="rect">
@@ -5214,7 +5153,7 @@
         </p:nvSpPr>
         <p:spPr>
           <a:xfrm>
-            <a:off x="6203416" y="1961801"/>
+            <a:off x="6063314" y="1961801"/>
             <a:ext cx="1214944" cy="907941"/>
           </a:xfrm>
           <a:prstGeom prst="rect">
@@ -5265,8 +5204,8 @@
         </p:nvSpPr>
         <p:spPr>
           <a:xfrm>
-            <a:off x="3371622" y="2779807"/>
-            <a:ext cx="736876" cy="261610"/>
+            <a:off x="3833968" y="2779807"/>
+            <a:ext cx="692901" cy="261610"/>
           </a:xfrm>
           <a:prstGeom prst="rect">
             <a:avLst/>
@@ -5304,8 +5243,8 @@
         </p:nvCxnSpPr>
         <p:spPr>
           <a:xfrm flipV="1">
-            <a:off x="4170944" y="2902525"/>
-            <a:ext cx="473522" cy="0"/>
+            <a:off x="4589316" y="2902525"/>
+            <a:ext cx="166548" cy="0"/>
           </a:xfrm>
           <a:prstGeom prst="straightConnector1">
             <a:avLst/>
@@ -5343,7 +5282,7 @@
         </p:nvSpPr>
         <p:spPr>
           <a:xfrm>
-            <a:off x="2239634" y="2604010"/>
+            <a:off x="2765832" y="2604010"/>
             <a:ext cx="893116" cy="516785"/>
           </a:xfrm>
           <a:prstGeom prst="can">
@@ -5396,7 +5335,7 @@
         </p:nvSpPr>
         <p:spPr>
           <a:xfrm>
-            <a:off x="2133211" y="2617743"/>
+            <a:off x="2664689" y="2599965"/>
             <a:ext cx="1095403" cy="523220"/>
           </a:xfrm>
           <a:prstGeom prst="rect">
@@ -5439,8 +5378,8 @@
         </p:nvCxnSpPr>
         <p:spPr>
           <a:xfrm>
-            <a:off x="4392693" y="4082522"/>
-            <a:ext cx="251773" cy="0"/>
+            <a:off x="4560977" y="4082522"/>
+            <a:ext cx="201268" cy="0"/>
           </a:xfrm>
           <a:prstGeom prst="straightConnector1">
             <a:avLst/>
@@ -5481,8 +5420,8 @@
         </p:nvCxnSpPr>
         <p:spPr>
           <a:xfrm>
-            <a:off x="4395117" y="3751874"/>
-            <a:ext cx="249349" cy="0"/>
+            <a:off x="4563556" y="3751874"/>
+            <a:ext cx="201113" cy="0"/>
           </a:xfrm>
           <a:prstGeom prst="straightConnector1">
             <a:avLst/>
@@ -5520,8 +5459,8 @@
         </p:nvSpPr>
         <p:spPr>
           <a:xfrm>
-            <a:off x="3099770" y="3628763"/>
-            <a:ext cx="1295347" cy="246221"/>
+            <a:off x="3007297" y="3628763"/>
+            <a:ext cx="1556259" cy="246221"/>
           </a:xfrm>
           <a:prstGeom prst="rect">
             <a:avLst/>
@@ -5571,8 +5510,8 @@
         </p:nvSpPr>
         <p:spPr>
           <a:xfrm>
-            <a:off x="3098638" y="3638882"/>
-            <a:ext cx="1269183" cy="246221"/>
+            <a:off x="2941574" y="3608691"/>
+            <a:ext cx="1554706" cy="276999"/>
           </a:xfrm>
           <a:prstGeom prst="rect">
             <a:avLst/>
@@ -5586,7 +5525,7 @@
           <a:lstStyle/>
           <a:p>
             <a:r>
-              <a:rPr lang="en-US" sz="1000" dirty="0"/>
+              <a:rPr lang="en-US" sz="1200" dirty="0"/>
               <a:t>Bug Fixing Commit</a:t>
             </a:r>
           </a:p>
@@ -5606,8 +5545,8 @@
         </p:nvSpPr>
         <p:spPr>
           <a:xfrm>
-            <a:off x="3098638" y="3952755"/>
-            <a:ext cx="1294055" cy="259534"/>
+            <a:off x="3006270" y="3952755"/>
+            <a:ext cx="1554707" cy="259534"/>
           </a:xfrm>
           <a:prstGeom prst="rect">
             <a:avLst/>
@@ -5657,8 +5596,8 @@
         </p:nvSpPr>
         <p:spPr>
           <a:xfrm>
-            <a:off x="3058121" y="3957992"/>
-            <a:ext cx="1425205" cy="246221"/>
+            <a:off x="2952243" y="3945053"/>
+            <a:ext cx="1817862" cy="276999"/>
           </a:xfrm>
           <a:prstGeom prst="rect">
             <a:avLst/>
@@ -5672,7 +5611,7 @@
           <a:lstStyle/>
           <a:p>
             <a:r>
-              <a:rPr lang="en-US" sz="1000" dirty="0"/>
+              <a:rPr lang="en-US" sz="1200" dirty="0"/>
               <a:t>New Function Commit</a:t>
             </a:r>
           </a:p>
@@ -5692,8 +5631,8 @@
         </p:nvSpPr>
         <p:spPr>
           <a:xfrm>
-            <a:off x="3023970" y="1512159"/>
-            <a:ext cx="1463538" cy="844395"/>
+            <a:off x="2941573" y="1512159"/>
+            <a:ext cx="1704157" cy="844395"/>
           </a:xfrm>
           <a:prstGeom prst="roundRect">
             <a:avLst>
@@ -5747,7 +5686,7 @@
         </p:nvSpPr>
         <p:spPr>
           <a:xfrm>
-            <a:off x="3023971" y="1471753"/>
+            <a:off x="3032595" y="1471753"/>
             <a:ext cx="1449402" cy="276999"/>
           </a:xfrm>
           <a:prstGeom prst="rect">
@@ -5783,8 +5722,8 @@
         </p:nvSpPr>
         <p:spPr>
           <a:xfrm>
-            <a:off x="3019788" y="3448274"/>
-            <a:ext cx="1463538" cy="844623"/>
+            <a:off x="2937252" y="3448274"/>
+            <a:ext cx="1703868" cy="844623"/>
           </a:xfrm>
           <a:prstGeom prst="roundRect">
             <a:avLst>
@@ -5838,8 +5777,8 @@
         </p:nvSpPr>
         <p:spPr>
           <a:xfrm>
-            <a:off x="3019789" y="3393492"/>
-            <a:ext cx="1449402" cy="276999"/>
+            <a:off x="2909613" y="3401433"/>
+            <a:ext cx="1725391" cy="276999"/>
           </a:xfrm>
           <a:prstGeom prst="rect">
             <a:avLst/>
@@ -5860,49 +5799,6 @@
           </a:p>
         </p:txBody>
       </p:sp>
-      <p:cxnSp>
-        <p:nvCxnSpPr>
-          <p:cNvPr id="103" name="Elbow Connector 102">
-            <a:extLst>
-              <a:ext uri="{FF2B5EF4-FFF2-40B4-BE49-F238E27FC236}">
-                <a16:creationId xmlns:a16="http://schemas.microsoft.com/office/drawing/2014/main" id="{C3B6A9E5-CA32-2D40-683E-947957A04BA8}"/>
-              </a:ext>
-            </a:extLst>
-          </p:cNvPr>
-          <p:cNvCxnSpPr>
-            <a:cxnSpLocks/>
-            <a:stCxn id="44" idx="3"/>
-            <a:endCxn id="97" idx="1"/>
-          </p:cNvCxnSpPr>
-          <p:nvPr/>
-        </p:nvCxnSpPr>
-        <p:spPr>
-          <a:xfrm rot="16200000" flipH="1">
-            <a:off x="2478095" y="3328892"/>
-            <a:ext cx="749791" cy="333596"/>
-          </a:xfrm>
-          <a:prstGeom prst="bentConnector2">
-            <a:avLst/>
-          </a:prstGeom>
-          <a:ln>
-            <a:tailEnd type="triangle"/>
-          </a:ln>
-        </p:spPr>
-        <p:style>
-          <a:lnRef idx="2">
-            <a:schemeClr val="accent1"/>
-          </a:lnRef>
-          <a:fillRef idx="0">
-            <a:schemeClr val="accent1"/>
-          </a:fillRef>
-          <a:effectRef idx="1">
-            <a:schemeClr val="accent1"/>
-          </a:effectRef>
-          <a:fontRef idx="minor">
-            <a:schemeClr val="tx1"/>
-          </a:fontRef>
-        </p:style>
-      </p:cxnSp>
       <p:cxnSp>
         <p:nvCxnSpPr>
           <p:cNvPr id="108" name="Straight Arrow Connector 107">
@@ -5921,8 +5817,8 @@
         </p:nvCxnSpPr>
         <p:spPr>
           <a:xfrm>
-            <a:off x="3132750" y="2862403"/>
-            <a:ext cx="176427" cy="150"/>
+            <a:off x="3658948" y="2862403"/>
+            <a:ext cx="113396" cy="150"/>
           </a:xfrm>
           <a:prstGeom prst="straightConnector1">
             <a:avLst/>
@@ -5963,7 +5859,7 @@
         <p:spPr>
           <a:xfrm>
             <a:off x="5066301" y="2663595"/>
-            <a:ext cx="187868" cy="0"/>
+            <a:ext cx="128016" cy="0"/>
           </a:xfrm>
           <a:prstGeom prst="straightConnector1">
             <a:avLst/>
@@ -6004,7 +5900,295 @@
         <p:spPr>
           <a:xfrm>
             <a:off x="5066301" y="3186806"/>
-            <a:ext cx="187868" cy="0"/>
+            <a:ext cx="128016" cy="0"/>
+          </a:xfrm>
+          <a:prstGeom prst="straightConnector1">
+            <a:avLst/>
+          </a:prstGeom>
+          <a:ln>
+            <a:tailEnd type="triangle"/>
+          </a:ln>
+        </p:spPr>
+        <p:style>
+          <a:lnRef idx="2">
+            <a:schemeClr val="accent1"/>
+          </a:lnRef>
+          <a:fillRef idx="0">
+            <a:schemeClr val="accent1"/>
+          </a:fillRef>
+          <a:effectRef idx="1">
+            <a:schemeClr val="accent1"/>
+          </a:effectRef>
+          <a:fontRef idx="minor">
+            <a:schemeClr val="tx1"/>
+          </a:fontRef>
+        </p:style>
+      </p:cxnSp>
+      <p:sp>
+        <p:nvSpPr>
+          <p:cNvPr id="27" name="TextBox 26">
+            <a:extLst>
+              <a:ext uri="{FF2B5EF4-FFF2-40B4-BE49-F238E27FC236}">
+                <a16:creationId xmlns:a16="http://schemas.microsoft.com/office/drawing/2014/main" id="{CDA99A7B-EBE7-0815-6526-D8A4995B6903}"/>
+              </a:ext>
+            </a:extLst>
+          </p:cNvPr>
+          <p:cNvSpPr txBox="1"/>
+          <p:nvPr/>
+        </p:nvSpPr>
+        <p:spPr>
+          <a:xfrm>
+            <a:off x="7273945" y="2275233"/>
+            <a:ext cx="1123706" cy="892552"/>
+          </a:xfrm>
+          <a:prstGeom prst="rect">
+            <a:avLst/>
+          </a:prstGeom>
+          <a:noFill/>
+        </p:spPr>
+        <p:txBody>
+          <a:bodyPr wrap="square">
+            <a:spAutoFit/>
+          </a:bodyPr>
+          <a:lstStyle/>
+          <a:p>
+            <a:r>
+              <a:rPr lang="en-US" sz="1200" dirty="0">
+                <a:solidFill>
+                  <a:schemeClr val="bg1"/>
+                </a:solidFill>
+              </a:rPr>
+              <a:t>Fail</a:t>
+            </a:r>
+            <a:endParaRPr lang="en-US" sz="1000" dirty="0">
+              <a:solidFill>
+                <a:schemeClr val="bg1"/>
+              </a:solidFill>
+            </a:endParaRPr>
+          </a:p>
+          <a:p>
+            <a:r>
+              <a:rPr lang="en-US" sz="1000" dirty="0">
+                <a:solidFill>
+                  <a:schemeClr val="bg1"/>
+                </a:solidFill>
+              </a:rPr>
+              <a:t>    Syntax Error</a:t>
+            </a:r>
+          </a:p>
+          <a:p>
+            <a:r>
+              <a:rPr lang="en-US" sz="1000" dirty="0">
+                <a:solidFill>
+                  <a:schemeClr val="bg1"/>
+                </a:solidFill>
+              </a:rPr>
+              <a:t>    Unsafe Cast</a:t>
+            </a:r>
+          </a:p>
+          <a:p>
+            <a:r>
+              <a:rPr lang="en-US" sz="1000" dirty="0">
+                <a:solidFill>
+                  <a:schemeClr val="bg1"/>
+                </a:solidFill>
+              </a:rPr>
+              <a:t>    Memory Error</a:t>
+            </a:r>
+          </a:p>
+          <a:p>
+            <a:r>
+              <a:rPr lang="en-US" sz="1000" dirty="0">
+                <a:solidFill>
+                  <a:schemeClr val="bg1"/>
+                </a:solidFill>
+              </a:rPr>
+              <a:t>    …</a:t>
+            </a:r>
+          </a:p>
+        </p:txBody>
+      </p:sp>
+      <p:sp>
+        <p:nvSpPr>
+          <p:cNvPr id="68" name="TextBox 67">
+            <a:extLst>
+              <a:ext uri="{FF2B5EF4-FFF2-40B4-BE49-F238E27FC236}">
+                <a16:creationId xmlns:a16="http://schemas.microsoft.com/office/drawing/2014/main" id="{CE85A8D7-B615-6199-50F3-67D461D1FDF4}"/>
+              </a:ext>
+            </a:extLst>
+          </p:cNvPr>
+          <p:cNvSpPr txBox="1"/>
+          <p:nvPr/>
+        </p:nvSpPr>
+        <p:spPr>
+          <a:xfrm>
+            <a:off x="7279312" y="1853732"/>
+            <a:ext cx="610112" cy="276999"/>
+          </a:xfrm>
+          <a:prstGeom prst="rect">
+            <a:avLst/>
+          </a:prstGeom>
+          <a:noFill/>
+        </p:spPr>
+        <p:txBody>
+          <a:bodyPr wrap="square">
+            <a:spAutoFit/>
+          </a:bodyPr>
+          <a:lstStyle/>
+          <a:p>
+            <a:r>
+              <a:rPr lang="en-US" sz="1200" dirty="0">
+                <a:solidFill>
+                  <a:schemeClr val="bg1"/>
+                </a:solidFill>
+              </a:rPr>
+              <a:t>Pass</a:t>
+            </a:r>
+            <a:endParaRPr lang="en-US" sz="1200" dirty="0"/>
+          </a:p>
+        </p:txBody>
+      </p:sp>
+      <p:sp>
+        <p:nvSpPr>
+          <p:cNvPr id="70" name="TextBox 69">
+            <a:extLst>
+              <a:ext uri="{FF2B5EF4-FFF2-40B4-BE49-F238E27FC236}">
+                <a16:creationId xmlns:a16="http://schemas.microsoft.com/office/drawing/2014/main" id="{EDE974D6-F640-D8DF-776C-A5E7DA522BE4}"/>
+              </a:ext>
+            </a:extLst>
+          </p:cNvPr>
+          <p:cNvSpPr txBox="1"/>
+          <p:nvPr/>
+        </p:nvSpPr>
+        <p:spPr>
+          <a:xfrm>
+            <a:off x="7273945" y="3354363"/>
+            <a:ext cx="610112" cy="276999"/>
+          </a:xfrm>
+          <a:prstGeom prst="rect">
+            <a:avLst/>
+          </a:prstGeom>
+          <a:noFill/>
+        </p:spPr>
+        <p:txBody>
+          <a:bodyPr wrap="square">
+            <a:spAutoFit/>
+          </a:bodyPr>
+          <a:lstStyle/>
+          <a:p>
+            <a:r>
+              <a:rPr lang="en-US" sz="1200" dirty="0">
+                <a:solidFill>
+                  <a:schemeClr val="bg1"/>
+                </a:solidFill>
+              </a:rPr>
+              <a:t>Pass</a:t>
+            </a:r>
+            <a:endParaRPr lang="en-US" sz="1200" dirty="0"/>
+          </a:p>
+        </p:txBody>
+      </p:sp>
+      <p:sp>
+        <p:nvSpPr>
+          <p:cNvPr id="71" name="TextBox 70">
+            <a:extLst>
+              <a:ext uri="{FF2B5EF4-FFF2-40B4-BE49-F238E27FC236}">
+                <a16:creationId xmlns:a16="http://schemas.microsoft.com/office/drawing/2014/main" id="{EA4AFD39-A007-366D-D997-BC785FF4B04F}"/>
+              </a:ext>
+            </a:extLst>
+          </p:cNvPr>
+          <p:cNvSpPr txBox="1"/>
+          <p:nvPr/>
+        </p:nvSpPr>
+        <p:spPr>
+          <a:xfrm>
+            <a:off x="7268002" y="3752540"/>
+            <a:ext cx="610112" cy="276999"/>
+          </a:xfrm>
+          <a:prstGeom prst="rect">
+            <a:avLst/>
+          </a:prstGeom>
+          <a:noFill/>
+        </p:spPr>
+        <p:txBody>
+          <a:bodyPr wrap="square">
+            <a:spAutoFit/>
+          </a:bodyPr>
+          <a:lstStyle/>
+          <a:p>
+            <a:r>
+              <a:rPr lang="en-US" sz="1200" dirty="0">
+                <a:solidFill>
+                  <a:schemeClr val="bg1"/>
+                </a:solidFill>
+              </a:rPr>
+              <a:t>Fail</a:t>
+            </a:r>
+            <a:endParaRPr lang="en-US" sz="1200" dirty="0"/>
+          </a:p>
+        </p:txBody>
+      </p:sp>
+      <p:cxnSp>
+        <p:nvCxnSpPr>
+          <p:cNvPr id="159" name="Straight Arrow Connector 158">
+            <a:extLst>
+              <a:ext uri="{FF2B5EF4-FFF2-40B4-BE49-F238E27FC236}">
+                <a16:creationId xmlns:a16="http://schemas.microsoft.com/office/drawing/2014/main" id="{F04650BB-CA97-CA6F-224D-3B15363B66AE}"/>
+              </a:ext>
+            </a:extLst>
+          </p:cNvPr>
+          <p:cNvCxnSpPr>
+            <a:cxnSpLocks/>
+            <a:stCxn id="44" idx="1"/>
+          </p:cNvCxnSpPr>
+          <p:nvPr/>
+        </p:nvCxnSpPr>
+        <p:spPr>
+          <a:xfrm flipH="1" flipV="1">
+            <a:off x="3211404" y="2357209"/>
+            <a:ext cx="986" cy="246801"/>
+          </a:xfrm>
+          <a:prstGeom prst="straightConnector1">
+            <a:avLst/>
+          </a:prstGeom>
+          <a:ln>
+            <a:tailEnd type="triangle"/>
+          </a:ln>
+        </p:spPr>
+        <p:style>
+          <a:lnRef idx="2">
+            <a:schemeClr val="accent1"/>
+          </a:lnRef>
+          <a:fillRef idx="0">
+            <a:schemeClr val="accent1"/>
+          </a:fillRef>
+          <a:effectRef idx="1">
+            <a:schemeClr val="accent1"/>
+          </a:effectRef>
+          <a:fontRef idx="minor">
+            <a:schemeClr val="tx1"/>
+          </a:fontRef>
+        </p:style>
+      </p:cxnSp>
+      <p:cxnSp>
+        <p:nvCxnSpPr>
+          <p:cNvPr id="162" name="Straight Arrow Connector 161">
+            <a:extLst>
+              <a:ext uri="{FF2B5EF4-FFF2-40B4-BE49-F238E27FC236}">
+                <a16:creationId xmlns:a16="http://schemas.microsoft.com/office/drawing/2014/main" id="{9B99158A-FE8E-7DD8-D6AE-1304F518D0C2}"/>
+              </a:ext>
+            </a:extLst>
+          </p:cNvPr>
+          <p:cNvCxnSpPr>
+            <a:cxnSpLocks/>
+            <a:stCxn id="44" idx="3"/>
+          </p:cNvCxnSpPr>
+          <p:nvPr/>
+        </p:nvCxnSpPr>
+        <p:spPr>
+          <a:xfrm>
+            <a:off x="3212390" y="3120795"/>
+            <a:ext cx="0" cy="327479"/>
           </a:xfrm>
           <a:prstGeom prst="straightConnector1">
             <a:avLst/>

</xml_diff>